<commit_message>
Model Update & Presenetation snapshots
Model updated to pull median and mean for weights and featureimportance snapshots for presentation
</commit_message>
<xml_diff>
--- a/Presentation.pptx
+++ b/Presentation.pptx
@@ -11,10 +11,9 @@
     <p:sldId id="260" r:id="rId5"/>
     <p:sldId id="263" r:id="rId6"/>
     <p:sldId id="261" r:id="rId7"/>
-    <p:sldId id="259" r:id="rId8"/>
-    <p:sldId id="264" r:id="rId9"/>
-    <p:sldId id="266" r:id="rId10"/>
-    <p:sldId id="262" r:id="rId11"/>
+    <p:sldId id="266" r:id="rId8"/>
+    <p:sldId id="259" r:id="rId9"/>
+    <p:sldId id="262" r:id="rId10"/>
   </p:sldIdLst>
   <p:sldSz cx="12192000" cy="6858000"/>
   <p:notesSz cx="6858000" cy="9144000"/>
@@ -252,7 +251,7 @@
           <a:p>
             <a:fld id="{EC854D12-3D0B-4CE7-91F6-BF32D5915F6C}" type="datetimeFigureOut">
               <a:rPr lang="en-US" smtClean="0"/>
-              <a:t>11/10/2022</a:t>
+              <a:t>11/17/2022</a:t>
             </a:fld>
             <a:endParaRPr lang="en-US"/>
           </a:p>
@@ -422,7 +421,7 @@
           <a:p>
             <a:fld id="{EC854D12-3D0B-4CE7-91F6-BF32D5915F6C}" type="datetimeFigureOut">
               <a:rPr lang="en-US" smtClean="0"/>
-              <a:t>11/10/2022</a:t>
+              <a:t>11/17/2022</a:t>
             </a:fld>
             <a:endParaRPr lang="en-US"/>
           </a:p>
@@ -602,7 +601,7 @@
           <a:p>
             <a:fld id="{EC854D12-3D0B-4CE7-91F6-BF32D5915F6C}" type="datetimeFigureOut">
               <a:rPr lang="en-US" smtClean="0"/>
-              <a:t>11/10/2022</a:t>
+              <a:t>11/17/2022</a:t>
             </a:fld>
             <a:endParaRPr lang="en-US"/>
           </a:p>
@@ -772,7 +771,7 @@
           <a:p>
             <a:fld id="{EC854D12-3D0B-4CE7-91F6-BF32D5915F6C}" type="datetimeFigureOut">
               <a:rPr lang="en-US" smtClean="0"/>
-              <a:t>11/10/2022</a:t>
+              <a:t>11/17/2022</a:t>
             </a:fld>
             <a:endParaRPr lang="en-US"/>
           </a:p>
@@ -1018,7 +1017,7 @@
           <a:p>
             <a:fld id="{EC854D12-3D0B-4CE7-91F6-BF32D5915F6C}" type="datetimeFigureOut">
               <a:rPr lang="en-US" smtClean="0"/>
-              <a:t>11/10/2022</a:t>
+              <a:t>11/17/2022</a:t>
             </a:fld>
             <a:endParaRPr lang="en-US"/>
           </a:p>
@@ -1250,7 +1249,7 @@
           <a:p>
             <a:fld id="{EC854D12-3D0B-4CE7-91F6-BF32D5915F6C}" type="datetimeFigureOut">
               <a:rPr lang="en-US" smtClean="0"/>
-              <a:t>11/10/2022</a:t>
+              <a:t>11/17/2022</a:t>
             </a:fld>
             <a:endParaRPr lang="en-US"/>
           </a:p>
@@ -1617,7 +1616,7 @@
           <a:p>
             <a:fld id="{EC854D12-3D0B-4CE7-91F6-BF32D5915F6C}" type="datetimeFigureOut">
               <a:rPr lang="en-US" smtClean="0"/>
-              <a:t>11/10/2022</a:t>
+              <a:t>11/17/2022</a:t>
             </a:fld>
             <a:endParaRPr lang="en-US"/>
           </a:p>
@@ -1735,7 +1734,7 @@
           <a:p>
             <a:fld id="{EC854D12-3D0B-4CE7-91F6-BF32D5915F6C}" type="datetimeFigureOut">
               <a:rPr lang="en-US" smtClean="0"/>
-              <a:t>11/10/2022</a:t>
+              <a:t>11/17/2022</a:t>
             </a:fld>
             <a:endParaRPr lang="en-US"/>
           </a:p>
@@ -1830,7 +1829,7 @@
           <a:p>
             <a:fld id="{EC854D12-3D0B-4CE7-91F6-BF32D5915F6C}" type="datetimeFigureOut">
               <a:rPr lang="en-US" smtClean="0"/>
-              <a:t>11/10/2022</a:t>
+              <a:t>11/17/2022</a:t>
             </a:fld>
             <a:endParaRPr lang="en-US"/>
           </a:p>
@@ -2107,7 +2106,7 @@
           <a:p>
             <a:fld id="{EC854D12-3D0B-4CE7-91F6-BF32D5915F6C}" type="datetimeFigureOut">
               <a:rPr lang="en-US" smtClean="0"/>
-              <a:t>11/10/2022</a:t>
+              <a:t>11/17/2022</a:t>
             </a:fld>
             <a:endParaRPr lang="en-US"/>
           </a:p>
@@ -2364,7 +2363,7 @@
           <a:p>
             <a:fld id="{EC854D12-3D0B-4CE7-91F6-BF32D5915F6C}" type="datetimeFigureOut">
               <a:rPr lang="en-US" smtClean="0"/>
-              <a:t>11/10/2022</a:t>
+              <a:t>11/17/2022</a:t>
             </a:fld>
             <a:endParaRPr lang="en-US"/>
           </a:p>
@@ -2577,7 +2576,7 @@
           <a:p>
             <a:fld id="{EC854D12-3D0B-4CE7-91F6-BF32D5915F6C}" type="datetimeFigureOut">
               <a:rPr lang="en-US" smtClean="0"/>
-              <a:t>11/10/2022</a:t>
+              <a:t>11/17/2022</a:t>
             </a:fld>
             <a:endParaRPr lang="en-US"/>
           </a:p>
@@ -3182,124 +3181,6 @@
 </p:sld>
 </file>
 
-<file path=ppt/slides/slide10.xml><?xml version="1.0" encoding="utf-8"?>
-<p:sld xmlns:a="http://schemas.openxmlformats.org/drawingml/2006/main" xmlns:r="http://schemas.openxmlformats.org/officeDocument/2006/relationships" xmlns:p="http://schemas.openxmlformats.org/presentationml/2006/main">
-  <p:cSld>
-    <p:spTree>
-      <p:nvGrpSpPr>
-        <p:cNvPr id="1" name=""/>
-        <p:cNvGrpSpPr/>
-        <p:nvPr/>
-      </p:nvGrpSpPr>
-      <p:grpSpPr>
-        <a:xfrm>
-          <a:off x="0" y="0"/>
-          <a:ext cx="0" cy="0"/>
-          <a:chOff x="0" y="0"/>
-          <a:chExt cx="0" cy="0"/>
-        </a:xfrm>
-      </p:grpSpPr>
-      <p:pic>
-        <p:nvPicPr>
-          <p:cNvPr id="4" name="Content Placeholder 4">
-            <a:extLst>
-              <a:ext uri="{FF2B5EF4-FFF2-40B4-BE49-F238E27FC236}">
-                <a16:creationId xmlns:a16="http://schemas.microsoft.com/office/drawing/2014/main" id="{6D68B1C1-1C7A-1471-EE84-8A37060EEA78}"/>
-              </a:ext>
-            </a:extLst>
-          </p:cNvPr>
-          <p:cNvPicPr>
-            <a:picLocks noChangeAspect="1"/>
-          </p:cNvPicPr>
-          <p:nvPr/>
-        </p:nvPicPr>
-        <p:blipFill>
-          <a:blip r:embed="rId2">
-            <a:extLst>
-              <a:ext uri="{28A0092B-C50C-407E-A947-70E740481C1C}">
-                <a14:useLocalDpi xmlns:a14="http://schemas.microsoft.com/office/drawing/2010/main" val="0"/>
-              </a:ext>
-            </a:extLst>
-          </a:blip>
-          <a:stretch>
-            <a:fillRect/>
-          </a:stretch>
-        </p:blipFill>
-        <p:spPr>
-          <a:xfrm>
-            <a:off x="3384176" y="845729"/>
-            <a:ext cx="5423647" cy="5381696"/>
-          </a:xfrm>
-          <a:prstGeom prst="rect">
-            <a:avLst/>
-          </a:prstGeom>
-        </p:spPr>
-      </p:pic>
-      <p:sp>
-        <p:nvSpPr>
-          <p:cNvPr id="5" name="Content Placeholder 2">
-            <a:extLst>
-              <a:ext uri="{FF2B5EF4-FFF2-40B4-BE49-F238E27FC236}">
-                <a16:creationId xmlns:a16="http://schemas.microsoft.com/office/drawing/2014/main" id="{9E6FC079-BA8D-8CB2-1177-FAD6668BCD2D}"/>
-              </a:ext>
-            </a:extLst>
-          </p:cNvPr>
-          <p:cNvSpPr>
-            <a:spLocks noGrp="1"/>
-          </p:cNvSpPr>
-          <p:nvPr>
-            <p:ph idx="1"/>
-          </p:nvPr>
-        </p:nvSpPr>
-        <p:spPr>
-          <a:xfrm>
-            <a:off x="3384176" y="83673"/>
-            <a:ext cx="5423646" cy="654479"/>
-          </a:xfrm>
-          <a:solidFill>
-            <a:schemeClr val="tx1">
-              <a:lumMod val="50000"/>
-              <a:lumOff val="50000"/>
-              <a:alpha val="19000"/>
-            </a:schemeClr>
-          </a:solidFill>
-          <a:effectLst>
-            <a:softEdge rad="63500"/>
-          </a:effectLst>
-        </p:spPr>
-        <p:txBody>
-          <a:bodyPr vert="horz" lIns="91440" tIns="45720" rIns="91440" bIns="45720" rtlCol="0">
-            <a:noAutofit/>
-          </a:bodyPr>
-          <a:lstStyle/>
-          <a:p>
-            <a:pPr marL="0" indent="0" algn="ctr">
-              <a:buNone/>
-            </a:pPr>
-            <a:r>
-              <a:rPr lang="en-US" sz="3600" dirty="0"/>
-              <a:t>Let’s go Fishing!</a:t>
-            </a:r>
-          </a:p>
-          <a:p>
-            <a:pPr algn="ctr"/>
-            <a:endParaRPr lang="en-US" sz="3600" dirty="0"/>
-          </a:p>
-        </p:txBody>
-      </p:sp>
-    </p:spTree>
-    <p:extLst>
-      <p:ext uri="{BB962C8B-B14F-4D97-AF65-F5344CB8AC3E}">
-        <p14:creationId xmlns:p14="http://schemas.microsoft.com/office/powerpoint/2010/main" val="156011991"/>
-      </p:ext>
-    </p:extLst>
-  </p:cSld>
-  <p:clrMapOvr>
-    <a:masterClrMapping/>
-  </p:clrMapOvr>
-</p:sld>
-</file>
-
 <file path=ppt/slides/slide2.xml><?xml version="1.0" encoding="utf-8"?>
 <p:sld xmlns:a="http://schemas.openxmlformats.org/drawingml/2006/main" xmlns:r="http://schemas.openxmlformats.org/officeDocument/2006/relationships" xmlns:p="http://schemas.openxmlformats.org/presentationml/2006/main">
   <p:cSld>
@@ -4335,7 +4216,12 @@
             <p:ph type="title"/>
           </p:nvPr>
         </p:nvSpPr>
-        <p:spPr/>
+        <p:spPr>
+          <a:xfrm>
+            <a:off x="838199" y="90253"/>
+            <a:ext cx="10515600" cy="1325563"/>
+          </a:xfrm>
+        </p:spPr>
         <p:txBody>
           <a:bodyPr/>
           <a:lstStyle/>
@@ -4370,7 +4256,7 @@
         </p:nvSpPr>
         <p:spPr>
           <a:xfrm>
-            <a:off x="1" y="1506070"/>
+            <a:off x="1" y="1034848"/>
             <a:ext cx="6095999" cy="2463501"/>
           </a:xfrm>
         </p:spPr>
@@ -4482,7 +4368,7 @@
         </p:blipFill>
         <p:spPr>
           <a:xfrm>
-            <a:off x="361939" y="3899646"/>
+            <a:off x="272528" y="3169019"/>
             <a:ext cx="4155553" cy="2593229"/>
           </a:xfrm>
           <a:prstGeom prst="rect">
@@ -4702,7 +4588,7 @@
         </p:nvSpPr>
         <p:spPr>
           <a:xfrm>
-            <a:off x="6096001" y="1506069"/>
+            <a:off x="6096001" y="1034847"/>
             <a:ext cx="6095999" cy="2463501"/>
           </a:xfrm>
           <a:prstGeom prst="rect">
@@ -4963,7 +4849,7 @@
         </p:blipFill>
         <p:spPr>
           <a:xfrm>
-            <a:off x="4995135" y="3899646"/>
+            <a:off x="4861085" y="5353777"/>
             <a:ext cx="2058533" cy="1461253"/>
           </a:xfrm>
           <a:prstGeom prst="rect">
@@ -4993,8 +4879,44 @@
         </p:blipFill>
         <p:spPr>
           <a:xfrm>
-            <a:off x="7196866" y="3899646"/>
+            <a:off x="7196865" y="4351529"/>
             <a:ext cx="4722607" cy="2463501"/>
+          </a:xfrm>
+          <a:prstGeom prst="rect">
+            <a:avLst/>
+          </a:prstGeom>
+        </p:spPr>
+      </p:pic>
+      <p:pic>
+        <p:nvPicPr>
+          <p:cNvPr id="10" name="Picture 9">
+            <a:extLst>
+              <a:ext uri="{FF2B5EF4-FFF2-40B4-BE49-F238E27FC236}">
+                <a16:creationId xmlns:a16="http://schemas.microsoft.com/office/drawing/2014/main" id="{8EA64BBD-7989-4022-92E9-394AB2F7928B}"/>
+              </a:ext>
+            </a:extLst>
+          </p:cNvPr>
+          <p:cNvPicPr>
+            <a:picLocks noChangeAspect="1"/>
+          </p:cNvPicPr>
+          <p:nvPr/>
+        </p:nvPicPr>
+        <p:blipFill>
+          <a:blip r:embed="rId7">
+            <a:extLst>
+              <a:ext uri="{28A0092B-C50C-407E-A947-70E740481C1C}">
+                <a14:useLocalDpi xmlns:a14="http://schemas.microsoft.com/office/drawing/2010/main" val="0"/>
+              </a:ext>
+            </a:extLst>
+          </a:blip>
+          <a:stretch>
+            <a:fillRect/>
+          </a:stretch>
+        </p:blipFill>
+        <p:spPr>
+          <a:xfrm>
+            <a:off x="4680508" y="3174199"/>
+            <a:ext cx="2419688" cy="2086266"/>
           </a:xfrm>
           <a:prstGeom prst="rect">
             <a:avLst/>
@@ -5129,7 +5051,7 @@
         </p:nvSpPr>
         <p:spPr>
           <a:xfrm>
-            <a:off x="838200" y="1690688"/>
+            <a:off x="124216" y="1586362"/>
             <a:ext cx="10515600" cy="1278423"/>
           </a:xfrm>
           <a:noFill/>
@@ -5153,7 +5075,7 @@
         </p:style>
         <p:txBody>
           <a:bodyPr vert="horz" lIns="91440" tIns="45720" rIns="91440" bIns="45720" rtlCol="0">
-            <a:normAutofit/>
+            <a:normAutofit fontScale="85000" lnSpcReduction="20000"/>
           </a:bodyPr>
           <a:lstStyle/>
           <a:p>
@@ -5167,13 +5089,10 @@
             </a:r>
           </a:p>
           <a:p>
-            <a:endParaRPr lang="en-US" dirty="0">
-              <a:solidFill>
-                <a:schemeClr val="bg1"/>
-              </a:solidFill>
-            </a:endParaRPr>
-          </a:p>
-          <a:p>
+            <a:r>
+              <a:rPr lang="en-US" dirty="0"/>
+              <a:t>After optimizing the model, the results revealed a 0.605 accuracy score</a:t>
+            </a:r>
             <a:endParaRPr lang="en-US" dirty="0">
               <a:solidFill>
                 <a:schemeClr val="bg1"/>
@@ -5204,8 +5123,68 @@
         </p:blipFill>
         <p:spPr>
           <a:xfrm>
-            <a:off x="838200" y="3299909"/>
+            <a:off x="124216" y="3277048"/>
             <a:ext cx="6580909" cy="3273014"/>
+          </a:xfrm>
+          <a:prstGeom prst="rect">
+            <a:avLst/>
+          </a:prstGeom>
+        </p:spPr>
+      </p:pic>
+      <p:pic>
+        <p:nvPicPr>
+          <p:cNvPr id="5" name="Picture 4">
+            <a:extLst>
+              <a:ext uri="{FF2B5EF4-FFF2-40B4-BE49-F238E27FC236}">
+                <a16:creationId xmlns:a16="http://schemas.microsoft.com/office/drawing/2014/main" id="{AD2D0C25-F53B-7020-9B65-238CE9C6F565}"/>
+              </a:ext>
+            </a:extLst>
+          </p:cNvPr>
+          <p:cNvPicPr>
+            <a:picLocks noChangeAspect="1"/>
+          </p:cNvPicPr>
+          <p:nvPr/>
+        </p:nvPicPr>
+        <p:blipFill>
+          <a:blip r:embed="rId4"/>
+          <a:stretch>
+            <a:fillRect/>
+          </a:stretch>
+        </p:blipFill>
+        <p:spPr>
+          <a:xfrm>
+            <a:off x="6829341" y="3277048"/>
+            <a:ext cx="3209925" cy="419100"/>
+          </a:xfrm>
+          <a:prstGeom prst="rect">
+            <a:avLst/>
+          </a:prstGeom>
+        </p:spPr>
+      </p:pic>
+      <p:pic>
+        <p:nvPicPr>
+          <p:cNvPr id="7" name="Picture 6">
+            <a:extLst>
+              <a:ext uri="{FF2B5EF4-FFF2-40B4-BE49-F238E27FC236}">
+                <a16:creationId xmlns:a16="http://schemas.microsoft.com/office/drawing/2014/main" id="{05C91FBE-C700-4DB7-77DF-5610252C094F}"/>
+              </a:ext>
+            </a:extLst>
+          </p:cNvPr>
+          <p:cNvPicPr>
+            <a:picLocks noChangeAspect="1"/>
+          </p:cNvPicPr>
+          <p:nvPr/>
+        </p:nvPicPr>
+        <p:blipFill>
+          <a:blip r:embed="rId5"/>
+          <a:stretch>
+            <a:fillRect/>
+          </a:stretch>
+        </p:blipFill>
+        <p:spPr>
+          <a:xfrm>
+            <a:off x="10163482" y="3277048"/>
+            <a:ext cx="1695450" cy="3429000"/>
           </a:xfrm>
           <a:prstGeom prst="rect">
             <a:avLst/>
@@ -5247,7 +5226,7 @@
           <p:cNvPr id="2" name="Title 1">
             <a:extLst>
               <a:ext uri="{FF2B5EF4-FFF2-40B4-BE49-F238E27FC236}">
-                <a16:creationId xmlns:a16="http://schemas.microsoft.com/office/drawing/2014/main" id="{257F8E74-A1EC-3726-DB99-4D31BF3CBA8E}"/>
+                <a16:creationId xmlns:a16="http://schemas.microsoft.com/office/drawing/2014/main" id="{CFCFF1C3-3803-9D7E-1FC6-64A16239168B}"/>
               </a:ext>
             </a:extLst>
           </p:cNvPr>
@@ -5265,71 +5244,17 @@
           <a:p>
             <a:r>
               <a:rPr lang="en-US" dirty="0"/>
-              <a:t>Dashboard</a:t>
-            </a:r>
-          </a:p>
-        </p:txBody>
-      </p:sp>
-      <p:sp>
-        <p:nvSpPr>
-          <p:cNvPr id="3" name="Content Placeholder 2">
+              <a:t>Feature Importance</a:t>
+            </a:r>
+          </a:p>
+        </p:txBody>
+      </p:sp>
+      <p:pic>
+        <p:nvPicPr>
+          <p:cNvPr id="4" name="Picture 3">
             <a:extLst>
               <a:ext uri="{FF2B5EF4-FFF2-40B4-BE49-F238E27FC236}">
-                <a16:creationId xmlns:a16="http://schemas.microsoft.com/office/drawing/2014/main" id="{AB48E276-44E4-E524-F132-1704323A06EB}"/>
-              </a:ext>
-            </a:extLst>
-          </p:cNvPr>
-          <p:cNvSpPr>
-            <a:spLocks noGrp="1"/>
-          </p:cNvSpPr>
-          <p:nvPr>
-            <p:ph idx="1"/>
-          </p:nvPr>
-        </p:nvSpPr>
-        <p:spPr>
-          <a:xfrm>
-            <a:off x="838200" y="1825625"/>
-            <a:ext cx="10515600" cy="1325563"/>
-          </a:xfrm>
-          <a:solidFill>
-            <a:schemeClr val="tx1">
-              <a:lumMod val="50000"/>
-              <a:lumOff val="50000"/>
-              <a:alpha val="19000"/>
-            </a:schemeClr>
-          </a:solidFill>
-          <a:effectLst>
-            <a:softEdge rad="63500"/>
-          </a:effectLst>
-        </p:spPr>
-        <p:txBody>
-          <a:bodyPr vert="horz" lIns="91440" tIns="45720" rIns="91440" bIns="45720" rtlCol="0">
-            <a:normAutofit/>
-          </a:bodyPr>
-          <a:lstStyle/>
-          <a:p>
-            <a:r>
-              <a:rPr lang="en-US" dirty="0"/>
-              <a:t>Interactive Dashboard on Tableau Public that breakdown the data.</a:t>
-            </a:r>
-          </a:p>
-          <a:p>
-            <a:r>
-              <a:rPr lang="en-US" dirty="0">
-                <a:hlinkClick r:id="rId2"/>
-              </a:rPr>
-              <a:t>Link to Workbook</a:t>
-            </a:r>
-            <a:endParaRPr lang="en-US" dirty="0"/>
-          </a:p>
-        </p:txBody>
-      </p:sp>
-      <p:pic>
-        <p:nvPicPr>
-          <p:cNvPr id="5" name="Picture 4">
-            <a:extLst>
-              <a:ext uri="{FF2B5EF4-FFF2-40B4-BE49-F238E27FC236}">
-                <a16:creationId xmlns:a16="http://schemas.microsoft.com/office/drawing/2014/main" id="{3C160A95-7594-F91B-05BD-D721B3CB564C}"/>
+                <a16:creationId xmlns:a16="http://schemas.microsoft.com/office/drawing/2014/main" id="{2AAAB14D-C8AA-5471-0806-A60C062D10C3}"/>
               </a:ext>
             </a:extLst>
           </p:cNvPr>
@@ -5339,15 +5264,195 @@
           <p:nvPr/>
         </p:nvPicPr>
         <p:blipFill>
-          <a:blip r:embed="rId3"/>
+          <a:blip r:embed="rId2"/>
           <a:stretch>
             <a:fillRect/>
           </a:stretch>
         </p:blipFill>
         <p:spPr>
           <a:xfrm>
-            <a:off x="4216998" y="2488406"/>
-            <a:ext cx="7136802" cy="3884958"/>
+            <a:off x="838200" y="1539372"/>
+            <a:ext cx="3600450" cy="4867275"/>
+          </a:xfrm>
+          <a:prstGeom prst="rect">
+            <a:avLst/>
+          </a:prstGeom>
+        </p:spPr>
+      </p:pic>
+      <p:pic>
+        <p:nvPicPr>
+          <p:cNvPr id="5" name="Picture 4">
+            <a:extLst>
+              <a:ext uri="{FF2B5EF4-FFF2-40B4-BE49-F238E27FC236}">
+                <a16:creationId xmlns:a16="http://schemas.microsoft.com/office/drawing/2014/main" id="{980EEED0-605D-D73E-95D7-868F01DA6C40}"/>
+              </a:ext>
+            </a:extLst>
+          </p:cNvPr>
+          <p:cNvPicPr>
+            <a:picLocks noChangeAspect="1"/>
+          </p:cNvPicPr>
+          <p:nvPr/>
+        </p:nvPicPr>
+        <p:blipFill>
+          <a:blip r:embed="rId3">
+            <a:extLst>
+              <a:ext uri="{28A0092B-C50C-407E-A947-70E740481C1C}">
+                <a14:useLocalDpi xmlns:a14="http://schemas.microsoft.com/office/drawing/2010/main" val="0"/>
+              </a:ext>
+            </a:extLst>
+          </a:blip>
+          <a:stretch>
+            <a:fillRect/>
+          </a:stretch>
+        </p:blipFill>
+        <p:spPr>
+          <a:xfrm>
+            <a:off x="5172178" y="1539372"/>
+            <a:ext cx="3305636" cy="1000265"/>
+          </a:xfrm>
+          <a:prstGeom prst="rect">
+            <a:avLst/>
+          </a:prstGeom>
+        </p:spPr>
+      </p:pic>
+      <p:pic>
+        <p:nvPicPr>
+          <p:cNvPr id="7" name="Picture 6">
+            <a:extLst>
+              <a:ext uri="{FF2B5EF4-FFF2-40B4-BE49-F238E27FC236}">
+                <a16:creationId xmlns:a16="http://schemas.microsoft.com/office/drawing/2014/main" id="{13801A38-6F25-B6A3-55CF-2E17A3304A72}"/>
+              </a:ext>
+            </a:extLst>
+          </p:cNvPr>
+          <p:cNvPicPr>
+            <a:picLocks noChangeAspect="1"/>
+          </p:cNvPicPr>
+          <p:nvPr/>
+        </p:nvPicPr>
+        <p:blipFill>
+          <a:blip r:embed="rId4">
+            <a:extLst>
+              <a:ext uri="{28A0092B-C50C-407E-A947-70E740481C1C}">
+                <a14:useLocalDpi xmlns:a14="http://schemas.microsoft.com/office/drawing/2010/main" val="0"/>
+              </a:ext>
+            </a:extLst>
+          </a:blip>
+          <a:stretch>
+            <a:fillRect/>
+          </a:stretch>
+        </p:blipFill>
+        <p:spPr>
+          <a:xfrm>
+            <a:off x="9211343" y="3967135"/>
+            <a:ext cx="2562583" cy="1019317"/>
+          </a:xfrm>
+          <a:prstGeom prst="rect">
+            <a:avLst/>
+          </a:prstGeom>
+        </p:spPr>
+      </p:pic>
+      <p:pic>
+        <p:nvPicPr>
+          <p:cNvPr id="9" name="Picture 8">
+            <a:extLst>
+              <a:ext uri="{FF2B5EF4-FFF2-40B4-BE49-F238E27FC236}">
+                <a16:creationId xmlns:a16="http://schemas.microsoft.com/office/drawing/2014/main" id="{F4E16246-B88E-A29B-DC7C-49A33CC98248}"/>
+              </a:ext>
+            </a:extLst>
+          </p:cNvPr>
+          <p:cNvPicPr>
+            <a:picLocks noChangeAspect="1"/>
+          </p:cNvPicPr>
+          <p:nvPr/>
+        </p:nvPicPr>
+        <p:blipFill>
+          <a:blip r:embed="rId5">
+            <a:extLst>
+              <a:ext uri="{28A0092B-C50C-407E-A947-70E740481C1C}">
+                <a14:useLocalDpi xmlns:a14="http://schemas.microsoft.com/office/drawing/2010/main" val="0"/>
+              </a:ext>
+            </a:extLst>
+          </a:blip>
+          <a:stretch>
+            <a:fillRect/>
+          </a:stretch>
+        </p:blipFill>
+        <p:spPr>
+          <a:xfrm>
+            <a:off x="5296020" y="2796659"/>
+            <a:ext cx="3057952" cy="3696216"/>
+          </a:xfrm>
+          <a:prstGeom prst="rect">
+            <a:avLst/>
+          </a:prstGeom>
+        </p:spPr>
+      </p:pic>
+      <p:pic>
+        <p:nvPicPr>
+          <p:cNvPr id="11" name="Picture 10">
+            <a:extLst>
+              <a:ext uri="{FF2B5EF4-FFF2-40B4-BE49-F238E27FC236}">
+                <a16:creationId xmlns:a16="http://schemas.microsoft.com/office/drawing/2014/main" id="{372253DA-7A7A-8C54-D079-94805419EE15}"/>
+              </a:ext>
+            </a:extLst>
+          </p:cNvPr>
+          <p:cNvPicPr>
+            <a:picLocks noChangeAspect="1"/>
+          </p:cNvPicPr>
+          <p:nvPr/>
+        </p:nvPicPr>
+        <p:blipFill>
+          <a:blip r:embed="rId6">
+            <a:extLst>
+              <a:ext uri="{28A0092B-C50C-407E-A947-70E740481C1C}">
+                <a14:useLocalDpi xmlns:a14="http://schemas.microsoft.com/office/drawing/2010/main" val="0"/>
+              </a:ext>
+            </a:extLst>
+          </a:blip>
+          <a:stretch>
+            <a:fillRect/>
+          </a:stretch>
+        </p:blipFill>
+        <p:spPr>
+          <a:xfrm>
+            <a:off x="8968423" y="147217"/>
+            <a:ext cx="3048425" cy="3515216"/>
+          </a:xfrm>
+          <a:prstGeom prst="rect">
+            <a:avLst/>
+          </a:prstGeom>
+        </p:spPr>
+      </p:pic>
+      <p:pic>
+        <p:nvPicPr>
+          <p:cNvPr id="13" name="Picture 12">
+            <a:extLst>
+              <a:ext uri="{FF2B5EF4-FFF2-40B4-BE49-F238E27FC236}">
+                <a16:creationId xmlns:a16="http://schemas.microsoft.com/office/drawing/2014/main" id="{C406B725-591D-61AE-2437-0C2466F4AC6F}"/>
+              </a:ext>
+            </a:extLst>
+          </p:cNvPr>
+          <p:cNvPicPr>
+            <a:picLocks noChangeAspect="1"/>
+          </p:cNvPicPr>
+          <p:nvPr/>
+        </p:nvPicPr>
+        <p:blipFill>
+          <a:blip r:embed="rId7">
+            <a:extLst>
+              <a:ext uri="{28A0092B-C50C-407E-A947-70E740481C1C}">
+                <a14:useLocalDpi xmlns:a14="http://schemas.microsoft.com/office/drawing/2010/main" val="0"/>
+              </a:ext>
+            </a:extLst>
+          </a:blip>
+          <a:stretch>
+            <a:fillRect/>
+          </a:stretch>
+        </p:blipFill>
+        <p:spPr>
+          <a:xfrm>
+            <a:off x="8930318" y="5358044"/>
+            <a:ext cx="3124636" cy="1352739"/>
           </a:xfrm>
           <a:prstGeom prst="rect">
             <a:avLst/>
@@ -5357,7 +5462,7 @@
     </p:spTree>
     <p:extLst>
       <p:ext uri="{BB962C8B-B14F-4D97-AF65-F5344CB8AC3E}">
-        <p14:creationId xmlns:p14="http://schemas.microsoft.com/office/powerpoint/2010/main" val="2980092636"/>
+        <p14:creationId xmlns:p14="http://schemas.microsoft.com/office/powerpoint/2010/main" val="2310727977"/>
       </p:ext>
     </p:extLst>
   </p:cSld>
@@ -5389,7 +5494,7 @@
           <p:cNvPr id="2" name="Title 1">
             <a:extLst>
               <a:ext uri="{FF2B5EF4-FFF2-40B4-BE49-F238E27FC236}">
-                <a16:creationId xmlns:a16="http://schemas.microsoft.com/office/drawing/2014/main" id="{787492B8-3650-942F-709D-C606D2FDE627}"/>
+                <a16:creationId xmlns:a16="http://schemas.microsoft.com/office/drawing/2014/main" id="{257F8E74-A1EC-3726-DB99-4D31BF3CBA8E}"/>
               </a:ext>
             </a:extLst>
           </p:cNvPr>
@@ -5400,54 +5505,84 @@
             <p:ph type="title"/>
           </p:nvPr>
         </p:nvSpPr>
-        <p:spPr/>
+        <p:spPr>
+          <a:xfrm>
+            <a:off x="838200" y="120867"/>
+            <a:ext cx="10515600" cy="1325563"/>
+          </a:xfrm>
+        </p:spPr>
         <p:txBody>
           <a:bodyPr/>
           <a:lstStyle/>
           <a:p>
+            <a:pPr algn="ctr"/>
             <a:r>
               <a:rPr lang="en-US" dirty="0"/>
-              <a:t>Model Testing Results</a:t>
-            </a:r>
-          </a:p>
-        </p:txBody>
-      </p:sp>
-      <p:pic>
-        <p:nvPicPr>
-          <p:cNvPr id="4" name="Picture 3">
+              <a:t>Dashboard</a:t>
+            </a:r>
+          </a:p>
+        </p:txBody>
+      </p:sp>
+      <p:sp>
+        <p:nvSpPr>
+          <p:cNvPr id="3" name="Content Placeholder 2">
             <a:extLst>
               <a:ext uri="{FF2B5EF4-FFF2-40B4-BE49-F238E27FC236}">
-                <a16:creationId xmlns:a16="http://schemas.microsoft.com/office/drawing/2014/main" id="{133DA288-8090-D049-91F6-0237EFB77945}"/>
+                <a16:creationId xmlns:a16="http://schemas.microsoft.com/office/drawing/2014/main" id="{AB48E276-44E4-E524-F132-1704323A06EB}"/>
               </a:ext>
             </a:extLst>
           </p:cNvPr>
-          <p:cNvPicPr>
-            <a:picLocks noChangeAspect="1"/>
-          </p:cNvPicPr>
-          <p:nvPr/>
-        </p:nvPicPr>
-        <p:blipFill>
-          <a:blip r:embed="rId2"/>
-          <a:stretch>
-            <a:fillRect/>
-          </a:stretch>
-        </p:blipFill>
+          <p:cNvSpPr>
+            <a:spLocks noGrp="1"/>
+          </p:cNvSpPr>
+          <p:nvPr>
+            <p:ph idx="1"/>
+          </p:nvPr>
+        </p:nvSpPr>
         <p:spPr>
           <a:xfrm>
-            <a:off x="955986" y="2210782"/>
-            <a:ext cx="3209925" cy="419100"/>
-          </a:xfrm>
-          <a:prstGeom prst="rect">
-            <a:avLst/>
-          </a:prstGeom>
-        </p:spPr>
-      </p:pic>
+            <a:off x="838200" y="1080326"/>
+            <a:ext cx="10515600" cy="1325563"/>
+          </a:xfrm>
+          <a:solidFill>
+            <a:schemeClr val="tx1">
+              <a:lumMod val="50000"/>
+              <a:lumOff val="50000"/>
+              <a:alpha val="19000"/>
+            </a:schemeClr>
+          </a:solidFill>
+          <a:effectLst>
+            <a:softEdge rad="63500"/>
+          </a:effectLst>
+        </p:spPr>
+        <p:txBody>
+          <a:bodyPr vert="horz" lIns="91440" tIns="45720" rIns="91440" bIns="45720" rtlCol="0">
+            <a:normAutofit/>
+          </a:bodyPr>
+          <a:lstStyle/>
+          <a:p>
+            <a:r>
+              <a:rPr lang="en-US" dirty="0"/>
+              <a:t>Interactive Dashboard on Tableau Public that breakdown the data.</a:t>
+            </a:r>
+          </a:p>
+          <a:p>
+            <a:r>
+              <a:rPr lang="en-US" dirty="0">
+                <a:hlinkClick r:id="rId2"/>
+              </a:rPr>
+              <a:t>Link to Workbook</a:t>
+            </a:r>
+            <a:endParaRPr lang="en-US" dirty="0"/>
+          </a:p>
+        </p:txBody>
+      </p:sp>
       <p:pic>
         <p:nvPicPr>
-          <p:cNvPr id="6" name="Picture 5">
+          <p:cNvPr id="5" name="Picture 4">
             <a:extLst>
               <a:ext uri="{FF2B5EF4-FFF2-40B4-BE49-F238E27FC236}">
-                <a16:creationId xmlns:a16="http://schemas.microsoft.com/office/drawing/2014/main" id="{CCDB25E7-EAEF-30C6-489B-ACF8431FF54A}"/>
+                <a16:creationId xmlns:a16="http://schemas.microsoft.com/office/drawing/2014/main" id="{3C160A95-7594-F91B-05BD-D721B3CB564C}"/>
               </a:ext>
             </a:extLst>
           </p:cNvPr>
@@ -5464,8 +5599,8 @@
         </p:blipFill>
         <p:spPr>
           <a:xfrm>
-            <a:off x="4795788" y="2210782"/>
-            <a:ext cx="1695450" cy="3429000"/>
+            <a:off x="3751546" y="1689482"/>
+            <a:ext cx="8232700" cy="4874156"/>
           </a:xfrm>
           <a:prstGeom prst="rect">
             <a:avLst/>
@@ -5475,7 +5610,7 @@
     </p:spTree>
     <p:extLst>
       <p:ext uri="{BB962C8B-B14F-4D97-AF65-F5344CB8AC3E}">
-        <p14:creationId xmlns:p14="http://schemas.microsoft.com/office/powerpoint/2010/main" val="3531217233"/>
+        <p14:creationId xmlns:p14="http://schemas.microsoft.com/office/powerpoint/2010/main" val="2980092636"/>
       </p:ext>
     </p:extLst>
   </p:cSld>
@@ -5502,40 +5637,12 @@
           <a:chExt cx="0" cy="0"/>
         </a:xfrm>
       </p:grpSpPr>
-      <p:sp>
-        <p:nvSpPr>
-          <p:cNvPr id="2" name="Title 1">
+      <p:pic>
+        <p:nvPicPr>
+          <p:cNvPr id="4" name="Content Placeholder 4">
             <a:extLst>
               <a:ext uri="{FF2B5EF4-FFF2-40B4-BE49-F238E27FC236}">
-                <a16:creationId xmlns:a16="http://schemas.microsoft.com/office/drawing/2014/main" id="{CFCFF1C3-3803-9D7E-1FC6-64A16239168B}"/>
-              </a:ext>
-            </a:extLst>
-          </p:cNvPr>
-          <p:cNvSpPr>
-            <a:spLocks noGrp="1"/>
-          </p:cNvSpPr>
-          <p:nvPr>
-            <p:ph type="title"/>
-          </p:nvPr>
-        </p:nvSpPr>
-        <p:spPr/>
-        <p:txBody>
-          <a:bodyPr/>
-          <a:lstStyle/>
-          <a:p>
-            <a:r>
-              <a:rPr lang="en-US" dirty="0"/>
-              <a:t>Feature Importance</a:t>
-            </a:r>
-          </a:p>
-        </p:txBody>
-      </p:sp>
-      <p:pic>
-        <p:nvPicPr>
-          <p:cNvPr id="4" name="Picture 3">
-            <a:extLst>
-              <a:ext uri="{FF2B5EF4-FFF2-40B4-BE49-F238E27FC236}">
-                <a16:creationId xmlns:a16="http://schemas.microsoft.com/office/drawing/2014/main" id="{2AAAB14D-C8AA-5471-0806-A60C062D10C3}"/>
+                <a16:creationId xmlns:a16="http://schemas.microsoft.com/office/drawing/2014/main" id="{6D68B1C1-1C7A-1471-EE84-8A37060EEA78}"/>
               </a:ext>
             </a:extLst>
           </p:cNvPr>
@@ -5545,25 +5652,83 @@
           <p:nvPr/>
         </p:nvPicPr>
         <p:blipFill>
-          <a:blip r:embed="rId2"/>
+          <a:blip r:embed="rId2">
+            <a:extLst>
+              <a:ext uri="{28A0092B-C50C-407E-A947-70E740481C1C}">
+                <a14:useLocalDpi xmlns:a14="http://schemas.microsoft.com/office/drawing/2010/main" val="0"/>
+              </a:ext>
+            </a:extLst>
+          </a:blip>
           <a:stretch>
             <a:fillRect/>
           </a:stretch>
         </p:blipFill>
         <p:spPr>
           <a:xfrm>
-            <a:off x="838200" y="1539372"/>
-            <a:ext cx="3600450" cy="4867275"/>
+            <a:off x="3384176" y="845729"/>
+            <a:ext cx="5423647" cy="5381696"/>
           </a:xfrm>
           <a:prstGeom prst="rect">
             <a:avLst/>
           </a:prstGeom>
         </p:spPr>
       </p:pic>
+      <p:sp>
+        <p:nvSpPr>
+          <p:cNvPr id="5" name="Content Placeholder 2">
+            <a:extLst>
+              <a:ext uri="{FF2B5EF4-FFF2-40B4-BE49-F238E27FC236}">
+                <a16:creationId xmlns:a16="http://schemas.microsoft.com/office/drawing/2014/main" id="{9E6FC079-BA8D-8CB2-1177-FAD6668BCD2D}"/>
+              </a:ext>
+            </a:extLst>
+          </p:cNvPr>
+          <p:cNvSpPr>
+            <a:spLocks noGrp="1"/>
+          </p:cNvSpPr>
+          <p:nvPr>
+            <p:ph idx="1"/>
+          </p:nvPr>
+        </p:nvSpPr>
+        <p:spPr>
+          <a:xfrm>
+            <a:off x="3384176" y="83673"/>
+            <a:ext cx="5423646" cy="654479"/>
+          </a:xfrm>
+          <a:solidFill>
+            <a:schemeClr val="tx1">
+              <a:lumMod val="50000"/>
+              <a:lumOff val="50000"/>
+              <a:alpha val="19000"/>
+            </a:schemeClr>
+          </a:solidFill>
+          <a:effectLst>
+            <a:softEdge rad="63500"/>
+          </a:effectLst>
+        </p:spPr>
+        <p:txBody>
+          <a:bodyPr vert="horz" lIns="91440" tIns="45720" rIns="91440" bIns="45720" rtlCol="0">
+            <a:noAutofit/>
+          </a:bodyPr>
+          <a:lstStyle/>
+          <a:p>
+            <a:pPr marL="0" indent="0" algn="ctr">
+              <a:buNone/>
+            </a:pPr>
+            <a:r>
+              <a:rPr lang="en-US" sz="3600" dirty="0"/>
+              <a:t>Let’s go Fishing!</a:t>
+            </a:r>
+          </a:p>
+          <a:p>
+            <a:pPr algn="ctr"/>
+            <a:endParaRPr lang="en-US" sz="3600" dirty="0"/>
+          </a:p>
+        </p:txBody>
+      </p:sp>
     </p:spTree>
     <p:extLst>
       <p:ext uri="{BB962C8B-B14F-4D97-AF65-F5344CB8AC3E}">
-        <p14:creationId xmlns:p14="http://schemas.microsoft.com/office/powerpoint/2010/main" val="2310727977"/>
+        <p14:creationId xmlns:p14="http://schemas.microsoft.com/office/powerpoint/2010/main" val="156011991"/>
       </p:ext>
     </p:extLst>
   </p:cSld>

</xml_diff>